<commit_message>
Update Dayton Ohio - Rethinking the Employer Portfolio for Population Growth - FINAL.pptx
</commit_message>
<xml_diff>
--- a/Dayton Ohio - Rethinking the Employer Portfolio for Population Growth - FINAL.pptx
+++ b/Dayton Ohio - Rethinking the Employer Portfolio for Population Growth - FINAL.pptx
@@ -109,6 +109,11 @@
       </a:defRPr>
     </a:lvl9pPr>
   </p:defaultTextStyle>
+  <p:extLst>
+    <p:ext uri="{EFAFB233-063F-42B5-8137-9DF3F51BA10A}">
+      <p15:sldGuideLst xmlns:p15="http://schemas.microsoft.com/office/powerpoint/2012/main"/>
+    </p:ext>
+  </p:extLst>
 </p:presentation>
 </file>
 
@@ -3986,7 +3991,15 @@
           <a:p>
             <a:r>
               <a:rPr lang="en-US" sz="2600" dirty="0"/>
-              <a:t>Dayton’s economic portfolio has an overabundance of service providers, which be hurting competition and inhibiting innovation in other sectors.</a:t>
+              <a:t>Dayton’s economic portfolio has an overabundance of service providers, which could be hurting competition </a:t>
+            </a:r>
+            <a:r>
+              <a:rPr lang="en-US" sz="2600"/>
+              <a:t>and stifling </a:t>
+            </a:r>
+            <a:r>
+              <a:rPr lang="en-US" sz="2600" dirty="0"/>
+              <a:t>innovation in other sectors.</a:t>
             </a:r>
             <a:br>
               <a:rPr lang="en-US" sz="2600" dirty="0"/>
@@ -3996,15 +4009,7 @@
           <a:p>
             <a:r>
               <a:rPr lang="en-US" sz="2600" dirty="0"/>
-              <a:t>Dayton policymakers should consider implementing negative tax incentives to reduce the proportion of service providers, then allocate the tax revenues into promoting and building residential, cultural, </a:t>
-            </a:r>
-            <a:r>
-              <a:rPr lang="en-US" sz="2600"/>
-              <a:t>recreational, commercial</a:t>
-            </a:r>
-            <a:r>
-              <a:rPr lang="en-US" sz="2600" dirty="0"/>
-              <a:t>, and transportation infrastructure.</a:t>
+              <a:t>Dayton policymakers should consider implementing negative tax incentives to reduce the proportion of service providers, then allocate the tax revenues into promoting and building residential, cultural, recreational, commercial, and transportation infrastructure.</a:t>
             </a:r>
           </a:p>
         </p:txBody>

</xml_diff>